<commit_message>
updating instructions for bonus
</commit_message>
<xml_diff>
--- a/ClassMaterials/ObjectIntroAndMisc/Slides/Part2-UsingDebugger.pptx
+++ b/ClassMaterials/ObjectIntroAndMisc/Slides/Part2-UsingDebugger.pptx
@@ -409,7 +409,7 @@
           <a:p>
             <a:fld id="{73386005-8F80-1A49-87D1-22EBFA47E352}" type="datetimeFigureOut">
               <a:rPr lang="en-US" smtClean="0"/>
-              <a:t>12/3/2023</a:t>
+              <a:t>12/5/2023</a:t>
             </a:fld>
             <a:endParaRPr lang="en-US"/>
           </a:p>
@@ -2548,7 +2548,7 @@
           <a:p>
             <a:fld id="{5B07E745-2C70-2943-8487-A8F6E88ADF5E}" type="datetimeFigureOut">
               <a:rPr lang="en-US" smtClean="0"/>
-              <a:t>12/3/2023</a:t>
+              <a:t>12/5/2023</a:t>
             </a:fld>
             <a:endParaRPr lang="en-US"/>
           </a:p>
@@ -2716,7 +2716,7 @@
           <a:p>
             <a:fld id="{5B07E745-2C70-2943-8487-A8F6E88ADF5E}" type="datetimeFigureOut">
               <a:rPr lang="en-US" smtClean="0"/>
-              <a:t>12/3/2023</a:t>
+              <a:t>12/5/2023</a:t>
             </a:fld>
             <a:endParaRPr lang="en-US"/>
           </a:p>
@@ -2894,7 +2894,7 @@
           <a:p>
             <a:fld id="{5B07E745-2C70-2943-8487-A8F6E88ADF5E}" type="datetimeFigureOut">
               <a:rPr lang="en-US" smtClean="0"/>
-              <a:t>12/3/2023</a:t>
+              <a:t>12/5/2023</a:t>
             </a:fld>
             <a:endParaRPr lang="en-US"/>
           </a:p>
@@ -3439,7 +3439,7 @@
           <a:p>
             <a:fld id="{5B07E745-2C70-2943-8487-A8F6E88ADF5E}" type="datetimeFigureOut">
               <a:rPr lang="en-US" smtClean="0"/>
-              <a:t>12/3/2023</a:t>
+              <a:t>12/5/2023</a:t>
             </a:fld>
             <a:endParaRPr lang="en-US"/>
           </a:p>
@@ -3684,7 +3684,7 @@
           <a:p>
             <a:fld id="{5B07E745-2C70-2943-8487-A8F6E88ADF5E}" type="datetimeFigureOut">
               <a:rPr lang="en-US" smtClean="0"/>
-              <a:t>12/3/2023</a:t>
+              <a:t>12/5/2023</a:t>
             </a:fld>
             <a:endParaRPr lang="en-US"/>
           </a:p>
@@ -3969,7 +3969,7 @@
           <a:p>
             <a:fld id="{5B07E745-2C70-2943-8487-A8F6E88ADF5E}" type="datetimeFigureOut">
               <a:rPr lang="en-US" smtClean="0"/>
-              <a:t>12/3/2023</a:t>
+              <a:t>12/5/2023</a:t>
             </a:fld>
             <a:endParaRPr lang="en-US"/>
           </a:p>
@@ -4388,7 +4388,7 @@
           <a:p>
             <a:fld id="{5B07E745-2C70-2943-8487-A8F6E88ADF5E}" type="datetimeFigureOut">
               <a:rPr lang="en-US" smtClean="0"/>
-              <a:t>12/3/2023</a:t>
+              <a:t>12/5/2023</a:t>
             </a:fld>
             <a:endParaRPr lang="en-US"/>
           </a:p>
@@ -4505,7 +4505,7 @@
           <a:p>
             <a:fld id="{5B07E745-2C70-2943-8487-A8F6E88ADF5E}" type="datetimeFigureOut">
               <a:rPr lang="en-US" smtClean="0"/>
-              <a:t>12/3/2023</a:t>
+              <a:t>12/5/2023</a:t>
             </a:fld>
             <a:endParaRPr lang="en-US"/>
           </a:p>
@@ -4600,7 +4600,7 @@
           <a:p>
             <a:fld id="{5B07E745-2C70-2943-8487-A8F6E88ADF5E}" type="datetimeFigureOut">
               <a:rPr lang="en-US" smtClean="0"/>
-              <a:t>12/3/2023</a:t>
+              <a:t>12/5/2023</a:t>
             </a:fld>
             <a:endParaRPr lang="en-US"/>
           </a:p>
@@ -4875,7 +4875,7 @@
           <a:p>
             <a:fld id="{5B07E745-2C70-2943-8487-A8F6E88ADF5E}" type="datetimeFigureOut">
               <a:rPr lang="en-US" smtClean="0"/>
-              <a:t>12/3/2023</a:t>
+              <a:t>12/5/2023</a:t>
             </a:fld>
             <a:endParaRPr lang="en-US"/>
           </a:p>
@@ -5127,7 +5127,7 @@
           <a:p>
             <a:fld id="{5B07E745-2C70-2943-8487-A8F6E88ADF5E}" type="datetimeFigureOut">
               <a:rPr lang="en-US" smtClean="0"/>
-              <a:t>12/3/2023</a:t>
+              <a:t>12/5/2023</a:t>
             </a:fld>
             <a:endParaRPr lang="en-US"/>
           </a:p>
@@ -5338,7 +5338,7 @@
           <a:p>
             <a:fld id="{5B07E745-2C70-2943-8487-A8F6E88ADF5E}" type="datetimeFigureOut">
               <a:rPr lang="en-US" smtClean="0"/>
-              <a:t>12/3/2023</a:t>
+              <a:t>12/5/2023</a:t>
             </a:fld>
             <a:endParaRPr lang="en-US"/>
           </a:p>
@@ -8206,18 +8206,48 @@
         </p:nvSpPr>
         <p:spPr/>
         <p:txBody>
-          <a:bodyPr/>
+          <a:bodyPr>
+            <a:normAutofit/>
+          </a:bodyPr>
           <a:lstStyle/>
           <a:p>
             <a:r>
               <a:rPr lang="en-US" dirty="0"/>
-              <a:t>Complete all of these practice debugging problems</a:t>
+              <a:t>Complete these practice debugging problems</a:t>
             </a:r>
           </a:p>
           <a:p>
             <a:r>
               <a:rPr lang="en-US" dirty="0"/>
-              <a:t>Write a quick summary of how you caught each bug</a:t>
+              <a:t>Write a summary of how you caught each bug</a:t>
+            </a:r>
+          </a:p>
+          <a:p>
+            <a:pPr lvl="1"/>
+            <a:r>
+              <a:rPr lang="en-US" dirty="0"/>
+              <a:t>Be sure to list:</a:t>
+            </a:r>
+          </a:p>
+          <a:p>
+            <a:pPr lvl="2"/>
+            <a:r>
+              <a:rPr lang="en-US" dirty="0"/>
+              <a:t>What line did you “catch” unexpected behavior?</a:t>
+            </a:r>
+          </a:p>
+          <a:p>
+            <a:pPr lvl="2"/>
+            <a:r>
+              <a:rPr lang="en-US" dirty="0"/>
+              <a:t>What was unexpected about the behavior?</a:t>
+            </a:r>
+          </a:p>
+          <a:p>
+            <a:pPr lvl="2"/>
+            <a:r>
+              <a:rPr lang="en-US" dirty="0"/>
+              <a:t>What did you determine from this?</a:t>
             </a:r>
           </a:p>
           <a:p>
@@ -11135,18 +11165,18 @@
 </file>
 
 <file path=customXml/item2.xml><?xml version="1.0" encoding="utf-8"?>
-<p:properties xmlns:p="http://schemas.microsoft.com/office/2006/metadata/properties" xmlns:xsi="http://www.w3.org/2001/XMLSchema-instance" xmlns:pc="http://schemas.microsoft.com/office/infopath/2007/PartnerControls">
-  <documentManagement/>
-</p:properties>
-</file>
-
-<file path=customXml/item3.xml><?xml version="1.0" encoding="utf-8"?>
 <?mso-contentType ?>
 <FormTemplates xmlns="http://schemas.microsoft.com/sharepoint/v3/contenttype/forms">
   <Display>DocumentLibraryForm</Display>
   <Edit>DocumentLibraryForm</Edit>
   <New>DocumentLibraryForm</New>
 </FormTemplates>
+</file>
+
+<file path=customXml/item3.xml><?xml version="1.0" encoding="utf-8"?>
+<p:properties xmlns:p="http://schemas.microsoft.com/office/2006/metadata/properties" xmlns:xsi="http://www.w3.org/2001/XMLSchema-instance" xmlns:pc="http://schemas.microsoft.com/office/infopath/2007/PartnerControls">
+  <documentManagement/>
+</p:properties>
 </file>
 
 <file path=customXml/itemProps1.xml><?xml version="1.0" encoding="utf-8"?>
@@ -11168,6 +11198,14 @@
 </file>
 
 <file path=customXml/itemProps2.xml><?xml version="1.0" encoding="utf-8"?>
+<ds:datastoreItem xmlns:ds="http://schemas.openxmlformats.org/officeDocument/2006/customXml" ds:itemID="{47B07C09-FF92-4115-A3C4-DCD45D83FCB5}">
+  <ds:schemaRefs>
+    <ds:schemaRef ds:uri="http://schemas.microsoft.com/sharepoint/v3/contenttype/forms"/>
+  </ds:schemaRefs>
+</ds:datastoreItem>
+</file>
+
+<file path=customXml/itemProps3.xml><?xml version="1.0" encoding="utf-8"?>
 <ds:datastoreItem xmlns:ds="http://schemas.openxmlformats.org/officeDocument/2006/customXml" ds:itemID="{60EBDBBA-925D-4342-9C69-C51A740C4A59}">
   <ds:schemaRefs>
     <ds:schemaRef ds:uri="http://www.w3.org/XML/1998/namespace"/>
@@ -11181,12 +11219,4 @@
     <ds:schemaRef ds:uri="79ddb764-415a-4c38-83b7-908be6382bea"/>
   </ds:schemaRefs>
 </ds:datastoreItem>
-</file>
-
-<file path=customXml/itemProps3.xml><?xml version="1.0" encoding="utf-8"?>
-<ds:datastoreItem xmlns:ds="http://schemas.openxmlformats.org/officeDocument/2006/customXml" ds:itemID="{47B07C09-FF92-4115-A3C4-DCD45D83FCB5}">
-  <ds:schemaRefs>
-    <ds:schemaRef ds:uri="http://schemas.microsoft.com/sharepoint/v3/contenttype/forms"/>
-  </ds:schemaRefs>
-</ds:datastoreItem>
 </file>
</xml_diff>